<commit_message>
Version finale de la présentation, dernières retouches
</commit_message>
<xml_diff>
--- a/Projet_5/p5.pptx
+++ b/Projet_5/p5.pptx
@@ -35,8 +35,8 @@
     <p:sldId id="343" r:id="rId26"/>
     <p:sldId id="365" r:id="rId27"/>
     <p:sldId id="308" r:id="rId28"/>
-    <p:sldId id="336" r:id="rId29"/>
-    <p:sldId id="353" r:id="rId30"/>
+    <p:sldId id="353" r:id="rId29"/>
+    <p:sldId id="336" r:id="rId30"/>
     <p:sldId id="328" r:id="rId31"/>
     <p:sldId id="322" r:id="rId32"/>
     <p:sldId id="310" r:id="rId33"/>
@@ -19614,15 +19614,7 @@
           <a:p>
             <a:r>
               <a:rPr lang="fr-FR" dirty="0"/>
-              <a:t>Dans  la construction des modèles</a:t>
-            </a:r>
-            <a:r>
-              <a:rPr lang="fr-FR"/>
-              <a:t>, cet </a:t>
-            </a:r>
-            <a:r>
-              <a:rPr lang="fr-FR" dirty="0"/>
-              <a:t>algorithme travaille de manière séquentielle. </a:t>
+              <a:t>Dans  la construction des modèles, cet algorithme travaille de manière séquentielle. </a:t>
             </a:r>
           </a:p>
           <a:p>
@@ -20637,507 +20629,6 @@
 </file>
 
 <file path=ppt/slides/slide28.xml><?xml version="1.0" encoding="utf-8"?>
-<p:sld xmlns:a="http://schemas.openxmlformats.org/drawingml/2006/main" xmlns:r="http://schemas.openxmlformats.org/officeDocument/2006/relationships" xmlns:p="http://schemas.openxmlformats.org/presentationml/2006/main">
-  <p:cSld>
-    <p:spTree>
-      <p:nvGrpSpPr>
-        <p:cNvPr id="1" name=""/>
-        <p:cNvGrpSpPr/>
-        <p:nvPr/>
-      </p:nvGrpSpPr>
-      <p:grpSpPr>
-        <a:xfrm>
-          <a:off x="0" y="0"/>
-          <a:ext cx="0" cy="0"/>
-          <a:chOff x="0" y="0"/>
-          <a:chExt cx="0" cy="0"/>
-        </a:xfrm>
-      </p:grpSpPr>
-      <p:sp>
-        <p:nvSpPr>
-          <p:cNvPr id="2" name="Titre 1">
-            <a:extLst>
-              <a:ext uri="{FF2B5EF4-FFF2-40B4-BE49-F238E27FC236}">
-                <a16:creationId xmlns:a16="http://schemas.microsoft.com/office/drawing/2014/main" id="{9566D7A5-4574-478A-BE66-0186A8806FFE}"/>
-              </a:ext>
-            </a:extLst>
-          </p:cNvPr>
-          <p:cNvSpPr>
-            <a:spLocks noGrp="1"/>
-          </p:cNvSpPr>
-          <p:nvPr>
-            <p:ph type="title"/>
-          </p:nvPr>
-        </p:nvSpPr>
-        <p:spPr/>
-        <p:txBody>
-          <a:bodyPr/>
-          <a:lstStyle/>
-          <a:p>
-            <a:r>
-              <a:rPr lang="fr-FR" dirty="0"/>
-              <a:t>VUE DE </a:t>
-            </a:r>
-            <a:r>
-              <a:rPr lang="fr-FR" dirty="0" err="1"/>
-              <a:t>l’aLGORITHME</a:t>
-            </a:r>
-            <a:endParaRPr lang="fr-FR" dirty="0"/>
-          </a:p>
-        </p:txBody>
-      </p:sp>
-      <p:sp>
-        <p:nvSpPr>
-          <p:cNvPr id="3" name="Espace réservé du contenu 2">
-            <a:extLst>
-              <a:ext uri="{FF2B5EF4-FFF2-40B4-BE49-F238E27FC236}">
-                <a16:creationId xmlns:a16="http://schemas.microsoft.com/office/drawing/2014/main" id="{C1A6A629-F503-4DB9-A151-EE704C2E6CB2}"/>
-              </a:ext>
-            </a:extLst>
-          </p:cNvPr>
-          <p:cNvSpPr>
-            <a:spLocks noGrp="1"/>
-          </p:cNvSpPr>
-          <p:nvPr>
-            <p:ph idx="1"/>
-          </p:nvPr>
-        </p:nvSpPr>
-        <p:spPr>
-          <a:xfrm>
-            <a:off x="2023539" y="1340768"/>
-            <a:ext cx="5005911" cy="5400600"/>
-          </a:xfrm>
-        </p:spPr>
-        <p:txBody>
-          <a:bodyPr/>
-          <a:lstStyle/>
-          <a:p>
-            <a:r>
-              <a:rPr lang="fr-FR" dirty="0"/>
-              <a:t>La fonction permet de faire passer tous les algorithmes de manière successive.</a:t>
-            </a:r>
-          </a:p>
-          <a:p>
-            <a:endParaRPr lang="fr-FR" dirty="0"/>
-          </a:p>
-          <a:p>
-            <a:r>
-              <a:rPr lang="fr-FR" dirty="0"/>
-              <a:t>De plus, on peut sauvegarder les « fit » grâce aux dumps de </a:t>
-            </a:r>
-            <a:r>
-              <a:rPr lang="fr-FR" dirty="0" err="1"/>
-              <a:t>joblib</a:t>
-            </a:r>
-            <a:r>
-              <a:rPr lang="fr-FR" dirty="0"/>
-              <a:t>.</a:t>
-            </a:r>
-          </a:p>
-        </p:txBody>
-      </p:sp>
-      <p:sp>
-        <p:nvSpPr>
-          <p:cNvPr id="5" name="Flèche droite 4">
-            <a:extLst>
-              <a:ext uri="{FF2B5EF4-FFF2-40B4-BE49-F238E27FC236}">
-                <a16:creationId xmlns:a16="http://schemas.microsoft.com/office/drawing/2014/main" id="{7739B819-9AFC-4C0F-A22A-81E3BAF2A986}"/>
-              </a:ext>
-            </a:extLst>
-          </p:cNvPr>
-          <p:cNvSpPr/>
-          <p:nvPr/>
-        </p:nvSpPr>
-        <p:spPr>
-          <a:xfrm>
-            <a:off x="11736625" y="6488757"/>
-            <a:ext cx="432048" cy="360040"/>
-          </a:xfrm>
-          <a:prstGeom prst="rightArrow">
-            <a:avLst/>
-          </a:prstGeom>
-          <a:ln/>
-        </p:spPr>
-        <p:style>
-          <a:lnRef idx="0">
-            <a:schemeClr val="dk1"/>
-          </a:lnRef>
-          <a:fillRef idx="3">
-            <a:schemeClr val="dk1"/>
-          </a:fillRef>
-          <a:effectRef idx="3">
-            <a:schemeClr val="dk1"/>
-          </a:effectRef>
-          <a:fontRef idx="minor">
-            <a:schemeClr val="lt1"/>
-          </a:fontRef>
-        </p:style>
-        <p:txBody>
-          <a:bodyPr rtlCol="0" anchor="ctr"/>
-          <a:lstStyle/>
-          <a:p>
-            <a:pPr algn="ctr"/>
-            <a:endParaRPr lang="fr-FR"/>
-          </a:p>
-        </p:txBody>
-      </p:sp>
-      <p:pic>
-        <p:nvPicPr>
-          <p:cNvPr id="7" name="Image 6">
-            <a:extLst>
-              <a:ext uri="{FF2B5EF4-FFF2-40B4-BE49-F238E27FC236}">
-                <a16:creationId xmlns:a16="http://schemas.microsoft.com/office/drawing/2014/main" id="{8291B76C-0B75-4D90-8B58-BF57647C75CD}"/>
-              </a:ext>
-            </a:extLst>
-          </p:cNvPr>
-          <p:cNvPicPr>
-            <a:picLocks noChangeAspect="1"/>
-          </p:cNvPicPr>
-          <p:nvPr/>
-        </p:nvPicPr>
-        <p:blipFill rotWithShape="1">
-          <a:blip r:embed="rId2"/>
-          <a:srcRect l="911" t="18681" r="65444" b="11453"/>
-          <a:stretch/>
-        </p:blipFill>
-        <p:spPr>
-          <a:xfrm>
-            <a:off x="7850667" y="1614234"/>
-            <a:ext cx="4101982" cy="4658380"/>
-          </a:xfrm>
-          <a:prstGeom prst="rect">
-            <a:avLst/>
-          </a:prstGeom>
-          <a:ln w="38100" cap="sq">
-            <a:solidFill>
-              <a:srgbClr val="000000"/>
-            </a:solidFill>
-            <a:prstDash val="solid"/>
-            <a:miter lim="800000"/>
-          </a:ln>
-          <a:effectLst>
-            <a:outerShdw blurRad="50800" dist="38100" dir="2700000" algn="tl" rotWithShape="0">
-              <a:srgbClr val="000000">
-                <a:alpha val="43000"/>
-              </a:srgbClr>
-            </a:outerShdw>
-          </a:effectLst>
-        </p:spPr>
-      </p:pic>
-      <p:pic>
-        <p:nvPicPr>
-          <p:cNvPr id="8" name="Image 7">
-            <a:extLst>
-              <a:ext uri="{FF2B5EF4-FFF2-40B4-BE49-F238E27FC236}">
-                <a16:creationId xmlns:a16="http://schemas.microsoft.com/office/drawing/2014/main" id="{675D846C-9DBC-4F69-9DD0-41AA79D4508F}"/>
-              </a:ext>
-            </a:extLst>
-          </p:cNvPr>
-          <p:cNvPicPr>
-            <a:picLocks noChangeAspect="1"/>
-          </p:cNvPicPr>
-          <p:nvPr/>
-        </p:nvPicPr>
-        <p:blipFill rotWithShape="1">
-          <a:blip r:embed="rId3"/>
-          <a:srcRect l="630" t="26000" r="65935" b="41829"/>
-          <a:stretch/>
-        </p:blipFill>
-        <p:spPr>
-          <a:xfrm>
-            <a:off x="7850667" y="2801697"/>
-            <a:ext cx="4076344" cy="2144994"/>
-          </a:xfrm>
-          <a:prstGeom prst="rect">
-            <a:avLst/>
-          </a:prstGeom>
-          <a:ln w="38100" cap="sq">
-            <a:solidFill>
-              <a:srgbClr val="000000"/>
-            </a:solidFill>
-            <a:prstDash val="solid"/>
-            <a:miter lim="800000"/>
-          </a:ln>
-          <a:effectLst>
-            <a:outerShdw blurRad="50800" dist="38100" dir="2700000" algn="tl" rotWithShape="0">
-              <a:srgbClr val="000000">
-                <a:alpha val="43000"/>
-              </a:srgbClr>
-            </a:outerShdw>
-          </a:effectLst>
-        </p:spPr>
-      </p:pic>
-    </p:spTree>
-    <p:extLst>
-      <p:ext uri="{BB962C8B-B14F-4D97-AF65-F5344CB8AC3E}">
-        <p14:creationId xmlns:p14="http://schemas.microsoft.com/office/powerpoint/2010/main" val="2948720513"/>
-      </p:ext>
-    </p:extLst>
-  </p:cSld>
-  <p:clrMapOvr>
-    <a:masterClrMapping/>
-  </p:clrMapOvr>
-  <p:timing>
-    <p:tnLst>
-      <p:par>
-        <p:cTn id="1" dur="indefinite" restart="never" nodeType="tmRoot">
-          <p:childTnLst>
-            <p:seq concurrent="1" nextAc="seek">
-              <p:cTn id="2" dur="indefinite" nodeType="mainSeq">
-                <p:childTnLst>
-                  <p:par>
-                    <p:cTn id="3" fill="hold">
-                      <p:stCondLst>
-                        <p:cond delay="indefinite"/>
-                      </p:stCondLst>
-                      <p:childTnLst>
-                        <p:par>
-                          <p:cTn id="4" fill="hold">
-                            <p:stCondLst>
-                              <p:cond delay="0"/>
-                            </p:stCondLst>
-                            <p:childTnLst>
-                              <p:par>
-                                <p:cTn id="5" presetID="1" presetClass="entr" presetSubtype="0" fill="hold" nodeType="clickEffect">
-                                  <p:stCondLst>
-                                    <p:cond delay="0"/>
-                                  </p:stCondLst>
-                                  <p:childTnLst>
-                                    <p:set>
-                                      <p:cBhvr>
-                                        <p:cTn id="6" dur="1" fill="hold">
-                                          <p:stCondLst>
-                                            <p:cond delay="0"/>
-                                          </p:stCondLst>
-                                        </p:cTn>
-                                        <p:tgtEl>
-                                          <p:spTgt spid="3">
-                                            <p:txEl>
-                                              <p:pRg st="0" end="0"/>
-                                            </p:txEl>
-                                          </p:spTgt>
-                                        </p:tgtEl>
-                                        <p:attrNameLst>
-                                          <p:attrName>style.visibility</p:attrName>
-                                        </p:attrNameLst>
-                                      </p:cBhvr>
-                                      <p:to>
-                                        <p:strVal val="visible"/>
-                                      </p:to>
-                                    </p:set>
-                                  </p:childTnLst>
-                                </p:cTn>
-                              </p:par>
-                            </p:childTnLst>
-                          </p:cTn>
-                        </p:par>
-                      </p:childTnLst>
-                    </p:cTn>
-                  </p:par>
-                  <p:par>
-                    <p:cTn id="7" fill="hold">
-                      <p:stCondLst>
-                        <p:cond delay="indefinite"/>
-                      </p:stCondLst>
-                      <p:childTnLst>
-                        <p:par>
-                          <p:cTn id="8" fill="hold">
-                            <p:stCondLst>
-                              <p:cond delay="0"/>
-                            </p:stCondLst>
-                            <p:childTnLst>
-                              <p:par>
-                                <p:cTn id="9" presetID="1" presetClass="entr" presetSubtype="0" fill="hold" nodeType="clickEffect">
-                                  <p:stCondLst>
-                                    <p:cond delay="0"/>
-                                  </p:stCondLst>
-                                  <p:childTnLst>
-                                    <p:set>
-                                      <p:cBhvr>
-                                        <p:cTn id="10" dur="1" fill="hold">
-                                          <p:stCondLst>
-                                            <p:cond delay="0"/>
-                                          </p:stCondLst>
-                                        </p:cTn>
-                                        <p:tgtEl>
-                                          <p:spTgt spid="3">
-                                            <p:txEl>
-                                              <p:pRg st="2" end="2"/>
-                                            </p:txEl>
-                                          </p:spTgt>
-                                        </p:tgtEl>
-                                        <p:attrNameLst>
-                                          <p:attrName>style.visibility</p:attrName>
-                                        </p:attrNameLst>
-                                      </p:cBhvr>
-                                      <p:to>
-                                        <p:strVal val="visible"/>
-                                      </p:to>
-                                    </p:set>
-                                  </p:childTnLst>
-                                </p:cTn>
-                              </p:par>
-                            </p:childTnLst>
-                          </p:cTn>
-                        </p:par>
-                      </p:childTnLst>
-                    </p:cTn>
-                  </p:par>
-                  <p:par>
-                    <p:cTn id="11" fill="hold">
-                      <p:stCondLst>
-                        <p:cond delay="indefinite"/>
-                      </p:stCondLst>
-                      <p:childTnLst>
-                        <p:par>
-                          <p:cTn id="12" fill="hold">
-                            <p:stCondLst>
-                              <p:cond delay="0"/>
-                            </p:stCondLst>
-                            <p:childTnLst>
-                              <p:par>
-                                <p:cTn id="13" presetID="1" presetClass="entr" presetSubtype="0" fill="hold" nodeType="clickEffect">
-                                  <p:stCondLst>
-                                    <p:cond delay="0"/>
-                                  </p:stCondLst>
-                                  <p:childTnLst>
-                                    <p:set>
-                                      <p:cBhvr>
-                                        <p:cTn id="14" dur="1" fill="hold">
-                                          <p:stCondLst>
-                                            <p:cond delay="0"/>
-                                          </p:stCondLst>
-                                        </p:cTn>
-                                        <p:tgtEl>
-                                          <p:spTgt spid="7"/>
-                                        </p:tgtEl>
-                                        <p:attrNameLst>
-                                          <p:attrName>style.visibility</p:attrName>
-                                        </p:attrNameLst>
-                                      </p:cBhvr>
-                                      <p:to>
-                                        <p:strVal val="visible"/>
-                                      </p:to>
-                                    </p:set>
-                                  </p:childTnLst>
-                                </p:cTn>
-                              </p:par>
-                            </p:childTnLst>
-                          </p:cTn>
-                        </p:par>
-                      </p:childTnLst>
-                    </p:cTn>
-                  </p:par>
-                  <p:par>
-                    <p:cTn id="15" fill="hold">
-                      <p:stCondLst>
-                        <p:cond delay="indefinite"/>
-                      </p:stCondLst>
-                      <p:childTnLst>
-                        <p:par>
-                          <p:cTn id="16" fill="hold">
-                            <p:stCondLst>
-                              <p:cond delay="0"/>
-                            </p:stCondLst>
-                            <p:childTnLst>
-                              <p:par>
-                                <p:cTn id="17" presetID="1" presetClass="entr" presetSubtype="0" fill="hold" nodeType="clickEffect">
-                                  <p:stCondLst>
-                                    <p:cond delay="0"/>
-                                  </p:stCondLst>
-                                  <p:childTnLst>
-                                    <p:set>
-                                      <p:cBhvr>
-                                        <p:cTn id="18" dur="1" fill="hold">
-                                          <p:stCondLst>
-                                            <p:cond delay="0"/>
-                                          </p:stCondLst>
-                                        </p:cTn>
-                                        <p:tgtEl>
-                                          <p:spTgt spid="8"/>
-                                        </p:tgtEl>
-                                        <p:attrNameLst>
-                                          <p:attrName>style.visibility</p:attrName>
-                                        </p:attrNameLst>
-                                      </p:cBhvr>
-                                      <p:to>
-                                        <p:strVal val="visible"/>
-                                      </p:to>
-                                    </p:set>
-                                  </p:childTnLst>
-                                </p:cTn>
-                              </p:par>
-                            </p:childTnLst>
-                          </p:cTn>
-                        </p:par>
-                        <p:par>
-                          <p:cTn id="19" fill="hold">
-                            <p:stCondLst>
-                              <p:cond delay="0"/>
-                            </p:stCondLst>
-                            <p:childTnLst>
-                              <p:par>
-                                <p:cTn id="20" presetID="1" presetClass="entr" presetSubtype="0" fill="hold" grpId="0" nodeType="afterEffect">
-                                  <p:stCondLst>
-                                    <p:cond delay="0"/>
-                                  </p:stCondLst>
-                                  <p:childTnLst>
-                                    <p:set>
-                                      <p:cBhvr>
-                                        <p:cTn id="21" dur="1" fill="hold">
-                                          <p:stCondLst>
-                                            <p:cond delay="0"/>
-                                          </p:stCondLst>
-                                        </p:cTn>
-                                        <p:tgtEl>
-                                          <p:spTgt spid="5"/>
-                                        </p:tgtEl>
-                                        <p:attrNameLst>
-                                          <p:attrName>style.visibility</p:attrName>
-                                        </p:attrNameLst>
-                                      </p:cBhvr>
-                                      <p:to>
-                                        <p:strVal val="visible"/>
-                                      </p:to>
-                                    </p:set>
-                                  </p:childTnLst>
-                                </p:cTn>
-                              </p:par>
-                            </p:childTnLst>
-                          </p:cTn>
-                        </p:par>
-                      </p:childTnLst>
-                    </p:cTn>
-                  </p:par>
-                </p:childTnLst>
-              </p:cTn>
-              <p:prevCondLst>
-                <p:cond evt="onPrev" delay="0">
-                  <p:tgtEl>
-                    <p:sldTgt/>
-                  </p:tgtEl>
-                </p:cond>
-              </p:prevCondLst>
-              <p:nextCondLst>
-                <p:cond evt="onNext" delay="0">
-                  <p:tgtEl>
-                    <p:sldTgt/>
-                  </p:tgtEl>
-                </p:cond>
-              </p:nextCondLst>
-            </p:seq>
-          </p:childTnLst>
-        </p:cTn>
-      </p:par>
-    </p:tnLst>
-    <p:bldLst>
-      <p:bldP spid="5" grpId="0" animBg="1"/>
-    </p:bldLst>
-  </p:timing>
-</p:sld>
-</file>
-
-<file path=ppt/slides/slide29.xml><?xml version="1.0" encoding="utf-8"?>
 <p:sld xmlns:a="http://schemas.openxmlformats.org/drawingml/2006/main" xmlns:r="http://schemas.openxmlformats.org/officeDocument/2006/relationships" xmlns:p="http://schemas.openxmlformats.org/presentationml/2006/main">
   <p:cSld>
     <p:bg>
@@ -22201,6 +21692,507 @@
     </p:tnLst>
     <p:bldLst>
       <p:bldP spid="8" grpId="0" animBg="1"/>
+    </p:bldLst>
+  </p:timing>
+</p:sld>
+</file>
+
+<file path=ppt/slides/slide29.xml><?xml version="1.0" encoding="utf-8"?>
+<p:sld xmlns:a="http://schemas.openxmlformats.org/drawingml/2006/main" xmlns:r="http://schemas.openxmlformats.org/officeDocument/2006/relationships" xmlns:p="http://schemas.openxmlformats.org/presentationml/2006/main">
+  <p:cSld>
+    <p:spTree>
+      <p:nvGrpSpPr>
+        <p:cNvPr id="1" name=""/>
+        <p:cNvGrpSpPr/>
+        <p:nvPr/>
+      </p:nvGrpSpPr>
+      <p:grpSpPr>
+        <a:xfrm>
+          <a:off x="0" y="0"/>
+          <a:ext cx="0" cy="0"/>
+          <a:chOff x="0" y="0"/>
+          <a:chExt cx="0" cy="0"/>
+        </a:xfrm>
+      </p:grpSpPr>
+      <p:sp>
+        <p:nvSpPr>
+          <p:cNvPr id="2" name="Titre 1">
+            <a:extLst>
+              <a:ext uri="{FF2B5EF4-FFF2-40B4-BE49-F238E27FC236}">
+                <a16:creationId xmlns:a16="http://schemas.microsoft.com/office/drawing/2014/main" id="{9566D7A5-4574-478A-BE66-0186A8806FFE}"/>
+              </a:ext>
+            </a:extLst>
+          </p:cNvPr>
+          <p:cNvSpPr>
+            <a:spLocks noGrp="1"/>
+          </p:cNvSpPr>
+          <p:nvPr>
+            <p:ph type="title"/>
+          </p:nvPr>
+        </p:nvSpPr>
+        <p:spPr/>
+        <p:txBody>
+          <a:bodyPr/>
+          <a:lstStyle/>
+          <a:p>
+            <a:r>
+              <a:rPr lang="fr-FR" dirty="0"/>
+              <a:t>VUE DE </a:t>
+            </a:r>
+            <a:r>
+              <a:rPr lang="fr-FR" dirty="0" err="1"/>
+              <a:t>l’aLGORITHME</a:t>
+            </a:r>
+            <a:endParaRPr lang="fr-FR" dirty="0"/>
+          </a:p>
+        </p:txBody>
+      </p:sp>
+      <p:sp>
+        <p:nvSpPr>
+          <p:cNvPr id="3" name="Espace réservé du contenu 2">
+            <a:extLst>
+              <a:ext uri="{FF2B5EF4-FFF2-40B4-BE49-F238E27FC236}">
+                <a16:creationId xmlns:a16="http://schemas.microsoft.com/office/drawing/2014/main" id="{C1A6A629-F503-4DB9-A151-EE704C2E6CB2}"/>
+              </a:ext>
+            </a:extLst>
+          </p:cNvPr>
+          <p:cNvSpPr>
+            <a:spLocks noGrp="1"/>
+          </p:cNvSpPr>
+          <p:nvPr>
+            <p:ph idx="1"/>
+          </p:nvPr>
+        </p:nvSpPr>
+        <p:spPr>
+          <a:xfrm>
+            <a:off x="2023539" y="1340768"/>
+            <a:ext cx="5005911" cy="5400600"/>
+          </a:xfrm>
+        </p:spPr>
+        <p:txBody>
+          <a:bodyPr/>
+          <a:lstStyle/>
+          <a:p>
+            <a:r>
+              <a:rPr lang="fr-FR" dirty="0"/>
+              <a:t>La fonction permet de faire passer tous les algorithmes de manière successive.</a:t>
+            </a:r>
+          </a:p>
+          <a:p>
+            <a:endParaRPr lang="fr-FR" dirty="0"/>
+          </a:p>
+          <a:p>
+            <a:r>
+              <a:rPr lang="fr-FR" dirty="0"/>
+              <a:t>De plus, on peut sauvegarder les « fit » grâce aux dumps de </a:t>
+            </a:r>
+            <a:r>
+              <a:rPr lang="fr-FR" dirty="0" err="1"/>
+              <a:t>joblib</a:t>
+            </a:r>
+            <a:r>
+              <a:rPr lang="fr-FR" dirty="0"/>
+              <a:t>.</a:t>
+            </a:r>
+          </a:p>
+        </p:txBody>
+      </p:sp>
+      <p:sp>
+        <p:nvSpPr>
+          <p:cNvPr id="5" name="Flèche droite 4">
+            <a:extLst>
+              <a:ext uri="{FF2B5EF4-FFF2-40B4-BE49-F238E27FC236}">
+                <a16:creationId xmlns:a16="http://schemas.microsoft.com/office/drawing/2014/main" id="{7739B819-9AFC-4C0F-A22A-81E3BAF2A986}"/>
+              </a:ext>
+            </a:extLst>
+          </p:cNvPr>
+          <p:cNvSpPr/>
+          <p:nvPr/>
+        </p:nvSpPr>
+        <p:spPr>
+          <a:xfrm>
+            <a:off x="11736625" y="6488757"/>
+            <a:ext cx="432048" cy="360040"/>
+          </a:xfrm>
+          <a:prstGeom prst="rightArrow">
+            <a:avLst/>
+          </a:prstGeom>
+          <a:ln/>
+        </p:spPr>
+        <p:style>
+          <a:lnRef idx="0">
+            <a:schemeClr val="dk1"/>
+          </a:lnRef>
+          <a:fillRef idx="3">
+            <a:schemeClr val="dk1"/>
+          </a:fillRef>
+          <a:effectRef idx="3">
+            <a:schemeClr val="dk1"/>
+          </a:effectRef>
+          <a:fontRef idx="minor">
+            <a:schemeClr val="lt1"/>
+          </a:fontRef>
+        </p:style>
+        <p:txBody>
+          <a:bodyPr rtlCol="0" anchor="ctr"/>
+          <a:lstStyle/>
+          <a:p>
+            <a:pPr algn="ctr"/>
+            <a:endParaRPr lang="fr-FR"/>
+          </a:p>
+        </p:txBody>
+      </p:sp>
+      <p:pic>
+        <p:nvPicPr>
+          <p:cNvPr id="7" name="Image 6">
+            <a:extLst>
+              <a:ext uri="{FF2B5EF4-FFF2-40B4-BE49-F238E27FC236}">
+                <a16:creationId xmlns:a16="http://schemas.microsoft.com/office/drawing/2014/main" id="{8291B76C-0B75-4D90-8B58-BF57647C75CD}"/>
+              </a:ext>
+            </a:extLst>
+          </p:cNvPr>
+          <p:cNvPicPr>
+            <a:picLocks noChangeAspect="1"/>
+          </p:cNvPicPr>
+          <p:nvPr/>
+        </p:nvPicPr>
+        <p:blipFill rotWithShape="1">
+          <a:blip r:embed="rId2"/>
+          <a:srcRect l="911" t="18681" r="65444" b="11453"/>
+          <a:stretch/>
+        </p:blipFill>
+        <p:spPr>
+          <a:xfrm>
+            <a:off x="7850667" y="1614234"/>
+            <a:ext cx="4101982" cy="4658380"/>
+          </a:xfrm>
+          <a:prstGeom prst="rect">
+            <a:avLst/>
+          </a:prstGeom>
+          <a:ln w="38100" cap="sq">
+            <a:solidFill>
+              <a:srgbClr val="000000"/>
+            </a:solidFill>
+            <a:prstDash val="solid"/>
+            <a:miter lim="800000"/>
+          </a:ln>
+          <a:effectLst>
+            <a:outerShdw blurRad="50800" dist="38100" dir="2700000" algn="tl" rotWithShape="0">
+              <a:srgbClr val="000000">
+                <a:alpha val="43000"/>
+              </a:srgbClr>
+            </a:outerShdw>
+          </a:effectLst>
+        </p:spPr>
+      </p:pic>
+      <p:pic>
+        <p:nvPicPr>
+          <p:cNvPr id="8" name="Image 7">
+            <a:extLst>
+              <a:ext uri="{FF2B5EF4-FFF2-40B4-BE49-F238E27FC236}">
+                <a16:creationId xmlns:a16="http://schemas.microsoft.com/office/drawing/2014/main" id="{675D846C-9DBC-4F69-9DD0-41AA79D4508F}"/>
+              </a:ext>
+            </a:extLst>
+          </p:cNvPr>
+          <p:cNvPicPr>
+            <a:picLocks noChangeAspect="1"/>
+          </p:cNvPicPr>
+          <p:nvPr/>
+        </p:nvPicPr>
+        <p:blipFill rotWithShape="1">
+          <a:blip r:embed="rId3"/>
+          <a:srcRect l="630" t="26000" r="65935" b="41829"/>
+          <a:stretch/>
+        </p:blipFill>
+        <p:spPr>
+          <a:xfrm>
+            <a:off x="7850667" y="2801697"/>
+            <a:ext cx="4076344" cy="2144994"/>
+          </a:xfrm>
+          <a:prstGeom prst="rect">
+            <a:avLst/>
+          </a:prstGeom>
+          <a:ln w="38100" cap="sq">
+            <a:solidFill>
+              <a:srgbClr val="000000"/>
+            </a:solidFill>
+            <a:prstDash val="solid"/>
+            <a:miter lim="800000"/>
+          </a:ln>
+          <a:effectLst>
+            <a:outerShdw blurRad="50800" dist="38100" dir="2700000" algn="tl" rotWithShape="0">
+              <a:srgbClr val="000000">
+                <a:alpha val="43000"/>
+              </a:srgbClr>
+            </a:outerShdw>
+          </a:effectLst>
+        </p:spPr>
+      </p:pic>
+    </p:spTree>
+    <p:extLst>
+      <p:ext uri="{BB962C8B-B14F-4D97-AF65-F5344CB8AC3E}">
+        <p14:creationId xmlns:p14="http://schemas.microsoft.com/office/powerpoint/2010/main" val="2948720513"/>
+      </p:ext>
+    </p:extLst>
+  </p:cSld>
+  <p:clrMapOvr>
+    <a:masterClrMapping/>
+  </p:clrMapOvr>
+  <p:timing>
+    <p:tnLst>
+      <p:par>
+        <p:cTn id="1" dur="indefinite" restart="never" nodeType="tmRoot">
+          <p:childTnLst>
+            <p:seq concurrent="1" nextAc="seek">
+              <p:cTn id="2" dur="indefinite" nodeType="mainSeq">
+                <p:childTnLst>
+                  <p:par>
+                    <p:cTn id="3" fill="hold">
+                      <p:stCondLst>
+                        <p:cond delay="indefinite"/>
+                      </p:stCondLst>
+                      <p:childTnLst>
+                        <p:par>
+                          <p:cTn id="4" fill="hold">
+                            <p:stCondLst>
+                              <p:cond delay="0"/>
+                            </p:stCondLst>
+                            <p:childTnLst>
+                              <p:par>
+                                <p:cTn id="5" presetID="1" presetClass="entr" presetSubtype="0" fill="hold" nodeType="clickEffect">
+                                  <p:stCondLst>
+                                    <p:cond delay="0"/>
+                                  </p:stCondLst>
+                                  <p:childTnLst>
+                                    <p:set>
+                                      <p:cBhvr>
+                                        <p:cTn id="6" dur="1" fill="hold">
+                                          <p:stCondLst>
+                                            <p:cond delay="0"/>
+                                          </p:stCondLst>
+                                        </p:cTn>
+                                        <p:tgtEl>
+                                          <p:spTgt spid="3">
+                                            <p:txEl>
+                                              <p:pRg st="0" end="0"/>
+                                            </p:txEl>
+                                          </p:spTgt>
+                                        </p:tgtEl>
+                                        <p:attrNameLst>
+                                          <p:attrName>style.visibility</p:attrName>
+                                        </p:attrNameLst>
+                                      </p:cBhvr>
+                                      <p:to>
+                                        <p:strVal val="visible"/>
+                                      </p:to>
+                                    </p:set>
+                                  </p:childTnLst>
+                                </p:cTn>
+                              </p:par>
+                            </p:childTnLst>
+                          </p:cTn>
+                        </p:par>
+                      </p:childTnLst>
+                    </p:cTn>
+                  </p:par>
+                  <p:par>
+                    <p:cTn id="7" fill="hold">
+                      <p:stCondLst>
+                        <p:cond delay="indefinite"/>
+                      </p:stCondLst>
+                      <p:childTnLst>
+                        <p:par>
+                          <p:cTn id="8" fill="hold">
+                            <p:stCondLst>
+                              <p:cond delay="0"/>
+                            </p:stCondLst>
+                            <p:childTnLst>
+                              <p:par>
+                                <p:cTn id="9" presetID="1" presetClass="entr" presetSubtype="0" fill="hold" nodeType="clickEffect">
+                                  <p:stCondLst>
+                                    <p:cond delay="0"/>
+                                  </p:stCondLst>
+                                  <p:childTnLst>
+                                    <p:set>
+                                      <p:cBhvr>
+                                        <p:cTn id="10" dur="1" fill="hold">
+                                          <p:stCondLst>
+                                            <p:cond delay="0"/>
+                                          </p:stCondLst>
+                                        </p:cTn>
+                                        <p:tgtEl>
+                                          <p:spTgt spid="3">
+                                            <p:txEl>
+                                              <p:pRg st="2" end="2"/>
+                                            </p:txEl>
+                                          </p:spTgt>
+                                        </p:tgtEl>
+                                        <p:attrNameLst>
+                                          <p:attrName>style.visibility</p:attrName>
+                                        </p:attrNameLst>
+                                      </p:cBhvr>
+                                      <p:to>
+                                        <p:strVal val="visible"/>
+                                      </p:to>
+                                    </p:set>
+                                  </p:childTnLst>
+                                </p:cTn>
+                              </p:par>
+                            </p:childTnLst>
+                          </p:cTn>
+                        </p:par>
+                      </p:childTnLst>
+                    </p:cTn>
+                  </p:par>
+                  <p:par>
+                    <p:cTn id="11" fill="hold">
+                      <p:stCondLst>
+                        <p:cond delay="indefinite"/>
+                      </p:stCondLst>
+                      <p:childTnLst>
+                        <p:par>
+                          <p:cTn id="12" fill="hold">
+                            <p:stCondLst>
+                              <p:cond delay="0"/>
+                            </p:stCondLst>
+                            <p:childTnLst>
+                              <p:par>
+                                <p:cTn id="13" presetID="1" presetClass="entr" presetSubtype="0" fill="hold" nodeType="clickEffect">
+                                  <p:stCondLst>
+                                    <p:cond delay="0"/>
+                                  </p:stCondLst>
+                                  <p:childTnLst>
+                                    <p:set>
+                                      <p:cBhvr>
+                                        <p:cTn id="14" dur="1" fill="hold">
+                                          <p:stCondLst>
+                                            <p:cond delay="0"/>
+                                          </p:stCondLst>
+                                        </p:cTn>
+                                        <p:tgtEl>
+                                          <p:spTgt spid="7"/>
+                                        </p:tgtEl>
+                                        <p:attrNameLst>
+                                          <p:attrName>style.visibility</p:attrName>
+                                        </p:attrNameLst>
+                                      </p:cBhvr>
+                                      <p:to>
+                                        <p:strVal val="visible"/>
+                                      </p:to>
+                                    </p:set>
+                                  </p:childTnLst>
+                                </p:cTn>
+                              </p:par>
+                            </p:childTnLst>
+                          </p:cTn>
+                        </p:par>
+                      </p:childTnLst>
+                    </p:cTn>
+                  </p:par>
+                  <p:par>
+                    <p:cTn id="15" fill="hold">
+                      <p:stCondLst>
+                        <p:cond delay="indefinite"/>
+                      </p:stCondLst>
+                      <p:childTnLst>
+                        <p:par>
+                          <p:cTn id="16" fill="hold">
+                            <p:stCondLst>
+                              <p:cond delay="0"/>
+                            </p:stCondLst>
+                            <p:childTnLst>
+                              <p:par>
+                                <p:cTn id="17" presetID="1" presetClass="entr" presetSubtype="0" fill="hold" nodeType="clickEffect">
+                                  <p:stCondLst>
+                                    <p:cond delay="0"/>
+                                  </p:stCondLst>
+                                  <p:childTnLst>
+                                    <p:set>
+                                      <p:cBhvr>
+                                        <p:cTn id="18" dur="1" fill="hold">
+                                          <p:stCondLst>
+                                            <p:cond delay="0"/>
+                                          </p:stCondLst>
+                                        </p:cTn>
+                                        <p:tgtEl>
+                                          <p:spTgt spid="8"/>
+                                        </p:tgtEl>
+                                        <p:attrNameLst>
+                                          <p:attrName>style.visibility</p:attrName>
+                                        </p:attrNameLst>
+                                      </p:cBhvr>
+                                      <p:to>
+                                        <p:strVal val="visible"/>
+                                      </p:to>
+                                    </p:set>
+                                  </p:childTnLst>
+                                </p:cTn>
+                              </p:par>
+                            </p:childTnLst>
+                          </p:cTn>
+                        </p:par>
+                        <p:par>
+                          <p:cTn id="19" fill="hold">
+                            <p:stCondLst>
+                              <p:cond delay="0"/>
+                            </p:stCondLst>
+                            <p:childTnLst>
+                              <p:par>
+                                <p:cTn id="20" presetID="1" presetClass="entr" presetSubtype="0" fill="hold" grpId="0" nodeType="afterEffect">
+                                  <p:stCondLst>
+                                    <p:cond delay="0"/>
+                                  </p:stCondLst>
+                                  <p:childTnLst>
+                                    <p:set>
+                                      <p:cBhvr>
+                                        <p:cTn id="21" dur="1" fill="hold">
+                                          <p:stCondLst>
+                                            <p:cond delay="0"/>
+                                          </p:stCondLst>
+                                        </p:cTn>
+                                        <p:tgtEl>
+                                          <p:spTgt spid="5"/>
+                                        </p:tgtEl>
+                                        <p:attrNameLst>
+                                          <p:attrName>style.visibility</p:attrName>
+                                        </p:attrNameLst>
+                                      </p:cBhvr>
+                                      <p:to>
+                                        <p:strVal val="visible"/>
+                                      </p:to>
+                                    </p:set>
+                                  </p:childTnLst>
+                                </p:cTn>
+                              </p:par>
+                            </p:childTnLst>
+                          </p:cTn>
+                        </p:par>
+                      </p:childTnLst>
+                    </p:cTn>
+                  </p:par>
+                </p:childTnLst>
+              </p:cTn>
+              <p:prevCondLst>
+                <p:cond evt="onPrev" delay="0">
+                  <p:tgtEl>
+                    <p:sldTgt/>
+                  </p:tgtEl>
+                </p:cond>
+              </p:prevCondLst>
+              <p:nextCondLst>
+                <p:cond evt="onNext" delay="0">
+                  <p:tgtEl>
+                    <p:sldTgt/>
+                  </p:tgtEl>
+                </p:cond>
+              </p:nextCondLst>
+            </p:seq>
+          </p:childTnLst>
+        </p:cTn>
+      </p:par>
+    </p:tnLst>
+    <p:bldLst>
+      <p:bldP spid="5" grpId="0" animBg="1"/>
     </p:bldLst>
   </p:timing>
 </p:sld>

</xml_diff>